<commit_message>
move test project to other folder and change document name
</commit_message>
<xml_diff>
--- a/Document/project_touhou_classified_technology.pptx
+++ b/Document/project_touhou_classified_technology.pptx
@@ -532,7 +532,7 @@
           <a:p>
             <a:fld id="{83ADA3AE-529C-4F8D-BF82-988D12B93D1B}" type="datetimeFigureOut">
               <a:rPr kumimoji="1" lang="ja-JP" altLang="en-US" smtClean="0"/>
-              <a:t>2019/12/27</a:t>
+              <a:t>2023/4/22</a:t>
             </a:fld>
             <a:endParaRPr kumimoji="1" lang="ja-JP" altLang="en-US"/>
           </a:p>
@@ -743,7 +743,7 @@
           <a:p>
             <a:fld id="{83ADA3AE-529C-4F8D-BF82-988D12B93D1B}" type="datetimeFigureOut">
               <a:rPr kumimoji="1" lang="ja-JP" altLang="en-US" smtClean="0"/>
-              <a:t>2019/12/27</a:t>
+              <a:t>2023/4/22</a:t>
             </a:fld>
             <a:endParaRPr kumimoji="1" lang="ja-JP" altLang="en-US"/>
           </a:p>
@@ -955,7 +955,7 @@
           <a:p>
             <a:fld id="{83ADA3AE-529C-4F8D-BF82-988D12B93D1B}" type="datetimeFigureOut">
               <a:rPr kumimoji="1" lang="ja-JP" altLang="en-US" smtClean="0"/>
-              <a:t>2019/12/27</a:t>
+              <a:t>2023/4/22</a:t>
             </a:fld>
             <a:endParaRPr kumimoji="1" lang="ja-JP" altLang="en-US"/>
           </a:p>
@@ -1157,7 +1157,7 @@
           <a:p>
             <a:fld id="{83ADA3AE-529C-4F8D-BF82-988D12B93D1B}" type="datetimeFigureOut">
               <a:rPr kumimoji="1" lang="ja-JP" altLang="en-US" smtClean="0"/>
-              <a:t>2019/12/27</a:t>
+              <a:t>2023/4/22</a:t>
             </a:fld>
             <a:endParaRPr kumimoji="1" lang="ja-JP" altLang="en-US"/>
           </a:p>
@@ -1470,7 +1470,7 @@
           <a:p>
             <a:fld id="{83ADA3AE-529C-4F8D-BF82-988D12B93D1B}" type="datetimeFigureOut">
               <a:rPr kumimoji="1" lang="ja-JP" altLang="en-US" smtClean="0"/>
-              <a:t>2019/12/27</a:t>
+              <a:t>2023/4/22</a:t>
             </a:fld>
             <a:endParaRPr kumimoji="1" lang="ja-JP" altLang="en-US"/>
           </a:p>
@@ -1920,7 +1920,7 @@
           <a:p>
             <a:fld id="{83ADA3AE-529C-4F8D-BF82-988D12B93D1B}" type="datetimeFigureOut">
               <a:rPr kumimoji="1" lang="ja-JP" altLang="en-US" smtClean="0"/>
-              <a:t>2019/12/27</a:t>
+              <a:t>2023/4/22</a:t>
             </a:fld>
             <a:endParaRPr kumimoji="1" lang="ja-JP" altLang="en-US"/>
           </a:p>
@@ -2418,7 +2418,7 @@
           <a:p>
             <a:fld id="{83ADA3AE-529C-4F8D-BF82-988D12B93D1B}" type="datetimeFigureOut">
               <a:rPr kumimoji="1" lang="ja-JP" altLang="en-US" smtClean="0"/>
-              <a:t>2019/12/27</a:t>
+              <a:t>2023/4/22</a:t>
             </a:fld>
             <a:endParaRPr kumimoji="1" lang="ja-JP" altLang="en-US"/>
           </a:p>
@@ -2536,7 +2536,7 @@
           <a:p>
             <a:fld id="{83ADA3AE-529C-4F8D-BF82-988D12B93D1B}" type="datetimeFigureOut">
               <a:rPr kumimoji="1" lang="ja-JP" altLang="en-US" smtClean="0"/>
-              <a:t>2019/12/27</a:t>
+              <a:t>2023/4/22</a:t>
             </a:fld>
             <a:endParaRPr kumimoji="1" lang="ja-JP" altLang="en-US"/>
           </a:p>
@@ -2631,7 +2631,7 @@
           <a:p>
             <a:fld id="{83ADA3AE-529C-4F8D-BF82-988D12B93D1B}" type="datetimeFigureOut">
               <a:rPr kumimoji="1" lang="ja-JP" altLang="en-US" smtClean="0"/>
-              <a:t>2019/12/27</a:t>
+              <a:t>2023/4/22</a:t>
             </a:fld>
             <a:endParaRPr kumimoji="1" lang="ja-JP" altLang="en-US"/>
           </a:p>
@@ -3013,7 +3013,7 @@
           <a:p>
             <a:fld id="{83ADA3AE-529C-4F8D-BF82-988D12B93D1B}" type="datetimeFigureOut">
               <a:rPr kumimoji="1" lang="ja-JP" altLang="en-US" smtClean="0"/>
-              <a:t>2019/12/27</a:t>
+              <a:t>2023/4/22</a:t>
             </a:fld>
             <a:endParaRPr kumimoji="1" lang="ja-JP" altLang="en-US"/>
           </a:p>
@@ -3438,7 +3438,7 @@
           <a:p>
             <a:fld id="{83ADA3AE-529C-4F8D-BF82-988D12B93D1B}" type="datetimeFigureOut">
               <a:rPr kumimoji="1" lang="ja-JP" altLang="en-US" smtClean="0"/>
-              <a:t>2019/12/27</a:t>
+              <a:t>2023/4/22</a:t>
             </a:fld>
             <a:endParaRPr kumimoji="1" lang="ja-JP" altLang="en-US"/>
           </a:p>
@@ -3751,7 +3751,7 @@
           <a:p>
             <a:fld id="{83ADA3AE-529C-4F8D-BF82-988D12B93D1B}" type="datetimeFigureOut">
               <a:rPr kumimoji="1" lang="ja-JP" altLang="en-US" smtClean="0"/>
-              <a:t>2019/12/27</a:t>
+              <a:t>2023/4/22</a:t>
             </a:fld>
             <a:endParaRPr kumimoji="1" lang="ja-JP" altLang="en-US"/>
           </a:p>
@@ -4373,10 +4373,10 @@
       </p:sp>
       <p:sp>
         <p:nvSpPr>
-          <p:cNvPr id="3" name="字幕 2">
+          <p:cNvPr id="5" name="부제목 4">
             <a:extLst>
               <a:ext uri="{FF2B5EF4-FFF2-40B4-BE49-F238E27FC236}">
-                <a16:creationId xmlns:a16="http://schemas.microsoft.com/office/drawing/2014/main" id="{A1C1DBF4-8684-43B6-BB20-A53DC20C9A67}"/>
+                <a16:creationId xmlns:a16="http://schemas.microsoft.com/office/drawing/2014/main" id="{6C20ADBC-796B-77A0-1F1C-2328ED0D31E1}"/>
               </a:ext>
             </a:extLst>
           </p:cNvPr>
@@ -4387,31 +4387,12 @@
             <p:ph type="subTitle" idx="1"/>
           </p:nvPr>
         </p:nvSpPr>
-        <p:spPr>
-          <a:xfrm>
-            <a:off x="9706063" y="4516438"/>
-            <a:ext cx="1031846" cy="349177"/>
-          </a:xfrm>
-        </p:spPr>
-        <p:txBody>
-          <a:bodyPr>
-            <a:normAutofit/>
-          </a:bodyPr>
+        <p:spPr/>
+        <p:txBody>
+          <a:bodyPr/>
           <a:lstStyle/>
           <a:p>
-            <a:r>
-              <a:rPr lang="en-US" altLang="ja-JP" sz="1400" dirty="0">
-                <a:solidFill>
-                  <a:schemeClr val="bg1"/>
-                </a:solidFill>
-              </a:rPr>
-              <a:t>Classified</a:t>
-            </a:r>
-            <a:endParaRPr lang="ja-JP" altLang="ja-JP" sz="1400" dirty="0">
-              <a:solidFill>
-                <a:schemeClr val="bg1"/>
-              </a:solidFill>
-            </a:endParaRPr>
+            <a:endParaRPr lang="ko-KR" altLang="en-US"/>
           </a:p>
         </p:txBody>
       </p:sp>

</xml_diff>